<commit_message>
Update Requirement for PoC
</commit_message>
<xml_diff>
--- a/RequirementAuction.pptx
+++ b/RequirementAuction.pptx
@@ -2996,20 +2996,12 @@
               <a:rPr lang="en-US" b="1" dirty="0" smtClean="0"/>
               <a:t>Requirement </a:t>
             </a:r>
-            <a:r>
-              <a:rPr lang="en-US" b="1" dirty="0" smtClean="0"/>
-              <a:t/>
-            </a:r>
             <a:br>
               <a:rPr lang="en-US" b="1" dirty="0" smtClean="0"/>
             </a:br>
             <a:r>
               <a:rPr lang="en-US" b="1" dirty="0" smtClean="0"/>
-              <a:t>for </a:t>
-            </a:r>
-            <a:r>
-              <a:rPr lang="en-US" b="1" dirty="0" smtClean="0"/>
-              <a:t>Project Auction</a:t>
+              <a:t>for Project Auction</a:t>
             </a:r>
             <a:endParaRPr lang="en-US" b="1" dirty="0"/>
           </a:p>
@@ -3517,11 +3509,7 @@
             <a:p>
               <a:r>
                 <a:rPr lang="en-US" sz="1400" dirty="0" smtClean="0"/>
-                <a:t>: </a:t>
-              </a:r>
-              <a:r>
-                <a:rPr lang="en-US" sz="1400" dirty="0" smtClean="0"/>
-                <a:t>create Participant</a:t>
+                <a:t>: create Participant</a:t>
               </a:r>
               <a:endParaRPr lang="en-US" sz="1400" dirty="0"/>
             </a:p>
@@ -4328,7 +4316,15 @@
             </a:r>
             <a:r>
               <a:rPr lang="en-US" sz="1600" dirty="0" smtClean="0"/>
-              <a:t>Offer| Price: 50$</a:t>
+              <a:t>Offer| </a:t>
+            </a:r>
+            <a:r>
+              <a:rPr lang="en-US" sz="1600" dirty="0" err="1" smtClean="0"/>
+              <a:t>BidPrice</a:t>
+            </a:r>
+            <a:r>
+              <a:rPr lang="en-US" sz="1600" dirty="0" smtClean="0"/>
+              <a:t>: 50$</a:t>
             </a:r>
             <a:endParaRPr lang="en-US" sz="1600" dirty="0"/>
           </a:p>
@@ -4343,7 +4339,7 @@
         <p:spPr>
           <a:xfrm>
             <a:off x="6135080" y="4649081"/>
-            <a:ext cx="1999776" cy="338554"/>
+            <a:ext cx="2192138" cy="338554"/>
           </a:xfrm>
           <a:prstGeom prst="rect">
             <a:avLst/>
@@ -4366,7 +4362,15 @@
             </a:r>
             <a:r>
               <a:rPr lang="en-US" sz="1600" dirty="0" smtClean="0"/>
-              <a:t>Offer| Price: 100$</a:t>
+              <a:t>Offer| </a:t>
+            </a:r>
+            <a:r>
+              <a:rPr lang="en-US" sz="1600" dirty="0" err="1" smtClean="0"/>
+              <a:t>BidPrice</a:t>
+            </a:r>
+            <a:r>
+              <a:rPr lang="en-US" sz="1600" dirty="0" smtClean="0"/>
+              <a:t>: 100$</a:t>
             </a:r>
             <a:endParaRPr lang="en-US" sz="1600" dirty="0"/>
           </a:p>
@@ -4381,7 +4385,7 @@
         <p:spPr>
           <a:xfrm>
             <a:off x="7177902" y="4155490"/>
-            <a:ext cx="1999776" cy="338554"/>
+            <a:ext cx="2093866" cy="338554"/>
           </a:xfrm>
           <a:prstGeom prst="rect">
             <a:avLst/>
@@ -4404,7 +4408,15 @@
             </a:r>
             <a:r>
               <a:rPr lang="en-US" sz="1600" dirty="0" smtClean="0"/>
-              <a:t>Offer| Price: 150$</a:t>
+              <a:t>Offer| </a:t>
+            </a:r>
+            <a:r>
+              <a:rPr lang="en-US" sz="1600" dirty="0" err="1" smtClean="0"/>
+              <a:t>BidPrice</a:t>
+            </a:r>
+            <a:r>
+              <a:rPr lang="en-US" sz="1600" dirty="0" smtClean="0"/>
+              <a:t>: 150$</a:t>
             </a:r>
             <a:endParaRPr lang="en-US" sz="1600" dirty="0"/>
           </a:p>
@@ -6421,7 +6433,6 @@
               <a:rPr lang="en-US" dirty="0" smtClean="0"/>
               <a:t>Seller</a:t>
             </a:r>
-            <a:endParaRPr lang="en-US" dirty="0" smtClean="0"/>
           </a:p>
           <a:p>
             <a:pPr lvl="1"/>

</xml_diff>